<commit_message>
minor revision and added two chapters in report.pdf
</commit_message>
<xml_diff>
--- a/data_flow.pptx
+++ b/data_flow.pptx
@@ -261,7 +261,7 @@
           <a:p>
             <a:fld id="{0C11E730-92C4-4229-B37A-CFD9F2FB14AB}" type="datetimeFigureOut">
               <a:rPr lang="en-US" smtClean="0"/>
-              <a:t>12/16/2023</a:t>
+              <a:t>12/29/2023</a:t>
             </a:fld>
             <a:endParaRPr lang="en-US"/>
           </a:p>
@@ -461,7 +461,7 @@
           <a:p>
             <a:fld id="{0C11E730-92C4-4229-B37A-CFD9F2FB14AB}" type="datetimeFigureOut">
               <a:rPr lang="en-US" smtClean="0"/>
-              <a:t>12/16/2023</a:t>
+              <a:t>12/29/2023</a:t>
             </a:fld>
             <a:endParaRPr lang="en-US"/>
           </a:p>
@@ -671,7 +671,7 @@
           <a:p>
             <a:fld id="{0C11E730-92C4-4229-B37A-CFD9F2FB14AB}" type="datetimeFigureOut">
               <a:rPr lang="en-US" smtClean="0"/>
-              <a:t>12/16/2023</a:t>
+              <a:t>12/29/2023</a:t>
             </a:fld>
             <a:endParaRPr lang="en-US"/>
           </a:p>
@@ -871,7 +871,7 @@
           <a:p>
             <a:fld id="{0C11E730-92C4-4229-B37A-CFD9F2FB14AB}" type="datetimeFigureOut">
               <a:rPr lang="en-US" smtClean="0"/>
-              <a:t>12/16/2023</a:t>
+              <a:t>12/29/2023</a:t>
             </a:fld>
             <a:endParaRPr lang="en-US"/>
           </a:p>
@@ -1147,7 +1147,7 @@
           <a:p>
             <a:fld id="{0C11E730-92C4-4229-B37A-CFD9F2FB14AB}" type="datetimeFigureOut">
               <a:rPr lang="en-US" smtClean="0"/>
-              <a:t>12/16/2023</a:t>
+              <a:t>12/29/2023</a:t>
             </a:fld>
             <a:endParaRPr lang="en-US"/>
           </a:p>
@@ -1415,7 +1415,7 @@
           <a:p>
             <a:fld id="{0C11E730-92C4-4229-B37A-CFD9F2FB14AB}" type="datetimeFigureOut">
               <a:rPr lang="en-US" smtClean="0"/>
-              <a:t>12/16/2023</a:t>
+              <a:t>12/29/2023</a:t>
             </a:fld>
             <a:endParaRPr lang="en-US"/>
           </a:p>
@@ -1830,7 +1830,7 @@
           <a:p>
             <a:fld id="{0C11E730-92C4-4229-B37A-CFD9F2FB14AB}" type="datetimeFigureOut">
               <a:rPr lang="en-US" smtClean="0"/>
-              <a:t>12/16/2023</a:t>
+              <a:t>12/29/2023</a:t>
             </a:fld>
             <a:endParaRPr lang="en-US"/>
           </a:p>
@@ -1972,7 +1972,7 @@
           <a:p>
             <a:fld id="{0C11E730-92C4-4229-B37A-CFD9F2FB14AB}" type="datetimeFigureOut">
               <a:rPr lang="en-US" smtClean="0"/>
-              <a:t>12/16/2023</a:t>
+              <a:t>12/29/2023</a:t>
             </a:fld>
             <a:endParaRPr lang="en-US"/>
           </a:p>
@@ -2085,7 +2085,7 @@
           <a:p>
             <a:fld id="{0C11E730-92C4-4229-B37A-CFD9F2FB14AB}" type="datetimeFigureOut">
               <a:rPr lang="en-US" smtClean="0"/>
-              <a:t>12/16/2023</a:t>
+              <a:t>12/29/2023</a:t>
             </a:fld>
             <a:endParaRPr lang="en-US"/>
           </a:p>
@@ -2398,7 +2398,7 @@
           <a:p>
             <a:fld id="{0C11E730-92C4-4229-B37A-CFD9F2FB14AB}" type="datetimeFigureOut">
               <a:rPr lang="en-US" smtClean="0"/>
-              <a:t>12/16/2023</a:t>
+              <a:t>12/29/2023</a:t>
             </a:fld>
             <a:endParaRPr lang="en-US"/>
           </a:p>
@@ -2687,7 +2687,7 @@
           <a:p>
             <a:fld id="{0C11E730-92C4-4229-B37A-CFD9F2FB14AB}" type="datetimeFigureOut">
               <a:rPr lang="en-US" smtClean="0"/>
-              <a:t>12/16/2023</a:t>
+              <a:t>12/29/2023</a:t>
             </a:fld>
             <a:endParaRPr lang="en-US"/>
           </a:p>
@@ -2930,7 +2930,7 @@
           <a:p>
             <a:fld id="{0C11E730-92C4-4229-B37A-CFD9F2FB14AB}" type="datetimeFigureOut">
               <a:rPr lang="en-US" smtClean="0"/>
-              <a:t>12/16/2023</a:t>
+              <a:t>12/29/2023</a:t>
             </a:fld>
             <a:endParaRPr lang="en-US"/>
           </a:p>
@@ -3662,7 +3662,7 @@
                   <a:srgbClr val="FF0000"/>
                 </a:solidFill>
               </a:rPr>
-              <a:t>gender_m</a:t>
+              <a:t>gender_M</a:t>
             </a:r>
             <a:endParaRPr lang="en-GB" sz="1200" dirty="0">
               <a:solidFill>
@@ -3677,7 +3677,7 @@
                   <a:srgbClr val="FF0000"/>
                 </a:solidFill>
               </a:rPr>
-              <a:t>gender_f</a:t>
+              <a:t>gender_F</a:t>
             </a:r>
             <a:endParaRPr lang="en-GB" sz="1200" dirty="0">
               <a:solidFill>
@@ -3692,7 +3692,7 @@
                   <a:srgbClr val="FF0000"/>
                 </a:solidFill>
               </a:rPr>
-              <a:t>gender_o</a:t>
+              <a:t>gender_O</a:t>
             </a:r>
             <a:endParaRPr lang="en-GB" sz="1200" dirty="0">
               <a:solidFill>
@@ -3818,21 +3818,25 @@
           <a:p>
             <a:r>
               <a:rPr lang="en-GB" sz="1200" dirty="0" err="1"/>
-              <a:t>gender_m</a:t>
+              <a:t>gender_M</a:t>
             </a:r>
             <a:endParaRPr lang="en-GB" sz="1200" dirty="0"/>
           </a:p>
           <a:p>
             <a:r>
               <a:rPr lang="en-GB" sz="1200" dirty="0" err="1"/>
-              <a:t>gender_f</a:t>
+              <a:t>gender_F</a:t>
             </a:r>
             <a:endParaRPr lang="en-GB" sz="1200" dirty="0"/>
           </a:p>
           <a:p>
             <a:r>
-              <a:rPr lang="en-GB" sz="1200" dirty="0" err="1"/>
-              <a:t>gender_o</a:t>
+              <a:rPr lang="en-GB" sz="1200" err="1"/>
+              <a:t>gender</a:t>
+            </a:r>
+            <a:r>
+              <a:rPr lang="en-GB" sz="1200"/>
+              <a:t>_O</a:t>
             </a:r>
             <a:endParaRPr lang="en-GB" sz="1200" dirty="0"/>
           </a:p>

</xml_diff>